<commit_message>
Recent updates for the same
</commit_message>
<xml_diff>
--- a/bbb-api-demo/src/main/webapp/BigBlueButton.pptx
+++ b/bbb-api-demo/src/main/webapp/BigBlueButton.pptx
@@ -1,15 +1,15 @@
 
 <file path=ppt/presentation.xml><?xml version="1.0" encoding="utf-8"?>
-<p:presentation xmlns:a="http://schemas.openxmlformats.org/drawingml/2006/main" xmlns:r="http://schemas.openxmlformats.org/officeDocument/2006/relationships" xmlns:p="http://schemas.openxmlformats.org/presentationml/2006/main" saveSubsetFonts="1">
+<p:presentation xmlns:a="http://schemas.openxmlformats.org/drawingml/2006/main" xmlns:r="http://schemas.openxmlformats.org/officeDocument/2006/relationships" xmlns:p="http://schemas.openxmlformats.org/presentationml/2006/main">
   <p:sldMasterIdLst>
     <p:sldMasterId id="2147483648" r:id="rId1"/>
   </p:sldMasterIdLst>
   <p:sldIdLst>
-    <p:sldId id="256" r:id="rId2"/>
-    <p:sldId id="257" r:id="rId3"/>
-    <p:sldId id="258" r:id="rId4"/>
-    <p:sldId id="259" r:id="rId5"/>
-    <p:sldId id="260" r:id="rId6"/>
+    <p:sldId id="256" r:id="rId3"/>
+    <p:sldId id="257" r:id="rId4"/>
+    <p:sldId id="258" r:id="rId5"/>
+    <p:sldId id="259" r:id="rId6"/>
+    <p:sldId id="260" r:id="rId7"/>
   </p:sldIdLst>
   <p:sldSz cx="9144000" cy="6858000" type="screen4x3"/>
   <p:notesSz cx="6858000" cy="9144000"/>
@@ -292,7 +292,6 @@
           <a:p>
             <a:fld id="{CD500CEA-160E-49C8-B972-D0B47816FB36}" type="datetimeFigureOut">
               <a:rPr lang="en-US" smtClean="0"/>
-              <a:t>8/24/2011</a:t>
             </a:fld>
             <a:endParaRPr lang="en-US"/>
           </a:p>
@@ -334,7 +333,6 @@
           <a:p>
             <a:fld id="{754A6C72-3788-48AC-AF84-02038561DE42}" type="slidenum">
               <a:rPr lang="en-US" smtClean="0"/>
-              <a:t>‹#›</a:t>
             </a:fld>
             <a:endParaRPr lang="en-US"/>
           </a:p>
@@ -408,6 +406,7 @@
               <a:rPr lang="en-US" smtClean="0"/>
               <a:t>Click to edit Master text styles</a:t>
             </a:r>
+            <a:endParaRPr lang="en-US" smtClean="0"/>
           </a:p>
           <a:p>
             <a:pPr lvl="1"/>
@@ -415,6 +414,7 @@
               <a:rPr lang="en-US" smtClean="0"/>
               <a:t>Second level</a:t>
             </a:r>
+            <a:endParaRPr lang="en-US" smtClean="0"/>
           </a:p>
           <a:p>
             <a:pPr lvl="2"/>
@@ -422,6 +422,7 @@
               <a:rPr lang="en-US" smtClean="0"/>
               <a:t>Third level</a:t>
             </a:r>
+            <a:endParaRPr lang="en-US" smtClean="0"/>
           </a:p>
           <a:p>
             <a:pPr lvl="3"/>
@@ -429,6 +430,7 @@
               <a:rPr lang="en-US" smtClean="0"/>
               <a:t>Fourth level</a:t>
             </a:r>
+            <a:endParaRPr lang="en-US" smtClean="0"/>
           </a:p>
           <a:p>
             <a:pPr lvl="4"/>
@@ -457,7 +459,6 @@
           <a:p>
             <a:fld id="{CD500CEA-160E-49C8-B972-D0B47816FB36}" type="datetimeFigureOut">
               <a:rPr lang="en-US" smtClean="0"/>
-              <a:t>8/24/2011</a:t>
             </a:fld>
             <a:endParaRPr lang="en-US"/>
           </a:p>
@@ -499,7 +500,6 @@
           <a:p>
             <a:fld id="{754A6C72-3788-48AC-AF84-02038561DE42}" type="slidenum">
               <a:rPr lang="en-US" smtClean="0"/>
-              <a:t>‹#›</a:t>
             </a:fld>
             <a:endParaRPr lang="en-US"/>
           </a:p>
@@ -583,6 +583,7 @@
               <a:rPr lang="en-US" smtClean="0"/>
               <a:t>Click to edit Master text styles</a:t>
             </a:r>
+            <a:endParaRPr lang="en-US" smtClean="0"/>
           </a:p>
           <a:p>
             <a:pPr lvl="1"/>
@@ -590,6 +591,7 @@
               <a:rPr lang="en-US" smtClean="0"/>
               <a:t>Second level</a:t>
             </a:r>
+            <a:endParaRPr lang="en-US" smtClean="0"/>
           </a:p>
           <a:p>
             <a:pPr lvl="2"/>
@@ -597,6 +599,7 @@
               <a:rPr lang="en-US" smtClean="0"/>
               <a:t>Third level</a:t>
             </a:r>
+            <a:endParaRPr lang="en-US" smtClean="0"/>
           </a:p>
           <a:p>
             <a:pPr lvl="3"/>
@@ -604,6 +607,7 @@
               <a:rPr lang="en-US" smtClean="0"/>
               <a:t>Fourth level</a:t>
             </a:r>
+            <a:endParaRPr lang="en-US" smtClean="0"/>
           </a:p>
           <a:p>
             <a:pPr lvl="4"/>
@@ -632,7 +636,6 @@
           <a:p>
             <a:fld id="{CD500CEA-160E-49C8-B972-D0B47816FB36}" type="datetimeFigureOut">
               <a:rPr lang="en-US" smtClean="0"/>
-              <a:t>8/24/2011</a:t>
             </a:fld>
             <a:endParaRPr lang="en-US"/>
           </a:p>
@@ -674,7 +677,6 @@
           <a:p>
             <a:fld id="{754A6C72-3788-48AC-AF84-02038561DE42}" type="slidenum">
               <a:rPr lang="en-US" smtClean="0"/>
-              <a:t>‹#›</a:t>
             </a:fld>
             <a:endParaRPr lang="en-US"/>
           </a:p>
@@ -748,6 +750,7 @@
               <a:rPr lang="en-US" smtClean="0"/>
               <a:t>Click to edit Master text styles</a:t>
             </a:r>
+            <a:endParaRPr lang="en-US" smtClean="0"/>
           </a:p>
           <a:p>
             <a:pPr lvl="1"/>
@@ -755,6 +758,7 @@
               <a:rPr lang="en-US" smtClean="0"/>
               <a:t>Second level</a:t>
             </a:r>
+            <a:endParaRPr lang="en-US" smtClean="0"/>
           </a:p>
           <a:p>
             <a:pPr lvl="2"/>
@@ -762,6 +766,7 @@
               <a:rPr lang="en-US" smtClean="0"/>
               <a:t>Third level</a:t>
             </a:r>
+            <a:endParaRPr lang="en-US" smtClean="0"/>
           </a:p>
           <a:p>
             <a:pPr lvl="3"/>
@@ -769,6 +774,7 @@
               <a:rPr lang="en-US" smtClean="0"/>
               <a:t>Fourth level</a:t>
             </a:r>
+            <a:endParaRPr lang="en-US" smtClean="0"/>
           </a:p>
           <a:p>
             <a:pPr lvl="4"/>
@@ -797,7 +803,6 @@
           <a:p>
             <a:fld id="{CD500CEA-160E-49C8-B972-D0B47816FB36}" type="datetimeFigureOut">
               <a:rPr lang="en-US" smtClean="0"/>
-              <a:t>8/24/2011</a:t>
             </a:fld>
             <a:endParaRPr lang="en-US"/>
           </a:p>
@@ -839,7 +844,6 @@
           <a:p>
             <a:fld id="{754A6C72-3788-48AC-AF84-02038561DE42}" type="slidenum">
               <a:rPr lang="en-US" smtClean="0"/>
-              <a:t>‹#›</a:t>
             </a:fld>
             <a:endParaRPr lang="en-US"/>
           </a:p>
@@ -1018,6 +1022,7 @@
               <a:rPr lang="en-US" smtClean="0"/>
               <a:t>Click to edit Master text styles</a:t>
             </a:r>
+            <a:endParaRPr lang="en-US" smtClean="0"/>
           </a:p>
         </p:txBody>
       </p:sp>
@@ -1038,7 +1043,6 @@
           <a:p>
             <a:fld id="{CD500CEA-160E-49C8-B972-D0B47816FB36}" type="datetimeFigureOut">
               <a:rPr lang="en-US" smtClean="0"/>
-              <a:t>8/24/2011</a:t>
             </a:fld>
             <a:endParaRPr lang="en-US"/>
           </a:p>
@@ -1080,7 +1084,6 @@
           <a:p>
             <a:fld id="{754A6C72-3788-48AC-AF84-02038561DE42}" type="slidenum">
               <a:rPr lang="en-US" smtClean="0"/>
-              <a:t>‹#›</a:t>
             </a:fld>
             <a:endParaRPr lang="en-US"/>
           </a:p>
@@ -1187,6 +1190,7 @@
               <a:rPr lang="en-US" smtClean="0"/>
               <a:t>Click to edit Master text styles</a:t>
             </a:r>
+            <a:endParaRPr lang="en-US" smtClean="0"/>
           </a:p>
           <a:p>
             <a:pPr lvl="1"/>
@@ -1194,6 +1198,7 @@
               <a:rPr lang="en-US" smtClean="0"/>
               <a:t>Second level</a:t>
             </a:r>
+            <a:endParaRPr lang="en-US" smtClean="0"/>
           </a:p>
           <a:p>
             <a:pPr lvl="2"/>
@@ -1201,6 +1206,7 @@
               <a:rPr lang="en-US" smtClean="0"/>
               <a:t>Third level</a:t>
             </a:r>
+            <a:endParaRPr lang="en-US" smtClean="0"/>
           </a:p>
           <a:p>
             <a:pPr lvl="3"/>
@@ -1208,6 +1214,7 @@
               <a:rPr lang="en-US" smtClean="0"/>
               <a:t>Fourth level</a:t>
             </a:r>
+            <a:endParaRPr lang="en-US" smtClean="0"/>
           </a:p>
           <a:p>
             <a:pPr lvl="4"/>
@@ -1272,6 +1279,7 @@
               <a:rPr lang="en-US" smtClean="0"/>
               <a:t>Click to edit Master text styles</a:t>
             </a:r>
+            <a:endParaRPr lang="en-US" smtClean="0"/>
           </a:p>
           <a:p>
             <a:pPr lvl="1"/>
@@ -1279,6 +1287,7 @@
               <a:rPr lang="en-US" smtClean="0"/>
               <a:t>Second level</a:t>
             </a:r>
+            <a:endParaRPr lang="en-US" smtClean="0"/>
           </a:p>
           <a:p>
             <a:pPr lvl="2"/>
@@ -1286,6 +1295,7 @@
               <a:rPr lang="en-US" smtClean="0"/>
               <a:t>Third level</a:t>
             </a:r>
+            <a:endParaRPr lang="en-US" smtClean="0"/>
           </a:p>
           <a:p>
             <a:pPr lvl="3"/>
@@ -1293,6 +1303,7 @@
               <a:rPr lang="en-US" smtClean="0"/>
               <a:t>Fourth level</a:t>
             </a:r>
+            <a:endParaRPr lang="en-US" smtClean="0"/>
           </a:p>
           <a:p>
             <a:pPr lvl="4"/>
@@ -1321,7 +1332,6 @@
           <a:p>
             <a:fld id="{CD500CEA-160E-49C8-B972-D0B47816FB36}" type="datetimeFigureOut">
               <a:rPr lang="en-US" smtClean="0"/>
-              <a:t>8/24/2011</a:t>
             </a:fld>
             <a:endParaRPr lang="en-US"/>
           </a:p>
@@ -1363,7 +1373,6 @@
           <a:p>
             <a:fld id="{754A6C72-3788-48AC-AF84-02038561DE42}" type="slidenum">
               <a:rPr lang="en-US" smtClean="0"/>
-              <a:t>‹#›</a:t>
             </a:fld>
             <a:endParaRPr lang="en-US"/>
           </a:p>
@@ -1483,6 +1492,7 @@
               <a:rPr lang="en-US" smtClean="0"/>
               <a:t>Click to edit Master text styles</a:t>
             </a:r>
+            <a:endParaRPr lang="en-US" smtClean="0"/>
           </a:p>
         </p:txBody>
       </p:sp>
@@ -1539,6 +1549,7 @@
               <a:rPr lang="en-US" smtClean="0"/>
               <a:t>Click to edit Master text styles</a:t>
             </a:r>
+            <a:endParaRPr lang="en-US" smtClean="0"/>
           </a:p>
           <a:p>
             <a:pPr lvl="1"/>
@@ -1546,6 +1557,7 @@
               <a:rPr lang="en-US" smtClean="0"/>
               <a:t>Second level</a:t>
             </a:r>
+            <a:endParaRPr lang="en-US" smtClean="0"/>
           </a:p>
           <a:p>
             <a:pPr lvl="2"/>
@@ -1553,6 +1565,7 @@
               <a:rPr lang="en-US" smtClean="0"/>
               <a:t>Third level</a:t>
             </a:r>
+            <a:endParaRPr lang="en-US" smtClean="0"/>
           </a:p>
           <a:p>
             <a:pPr lvl="3"/>
@@ -1560,6 +1573,7 @@
               <a:rPr lang="en-US" smtClean="0"/>
               <a:t>Fourth level</a:t>
             </a:r>
+            <a:endParaRPr lang="en-US" smtClean="0"/>
           </a:p>
           <a:p>
             <a:pPr lvl="4"/>
@@ -1633,6 +1647,7 @@
               <a:rPr lang="en-US" smtClean="0"/>
               <a:t>Click to edit Master text styles</a:t>
             </a:r>
+            <a:endParaRPr lang="en-US" smtClean="0"/>
           </a:p>
         </p:txBody>
       </p:sp>
@@ -1689,6 +1704,7 @@
               <a:rPr lang="en-US" smtClean="0"/>
               <a:t>Click to edit Master text styles</a:t>
             </a:r>
+            <a:endParaRPr lang="en-US" smtClean="0"/>
           </a:p>
           <a:p>
             <a:pPr lvl="1"/>
@@ -1696,6 +1712,7 @@
               <a:rPr lang="en-US" smtClean="0"/>
               <a:t>Second level</a:t>
             </a:r>
+            <a:endParaRPr lang="en-US" smtClean="0"/>
           </a:p>
           <a:p>
             <a:pPr lvl="2"/>
@@ -1703,6 +1720,7 @@
               <a:rPr lang="en-US" smtClean="0"/>
               <a:t>Third level</a:t>
             </a:r>
+            <a:endParaRPr lang="en-US" smtClean="0"/>
           </a:p>
           <a:p>
             <a:pPr lvl="3"/>
@@ -1710,6 +1728,7 @@
               <a:rPr lang="en-US" smtClean="0"/>
               <a:t>Fourth level</a:t>
             </a:r>
+            <a:endParaRPr lang="en-US" smtClean="0"/>
           </a:p>
           <a:p>
             <a:pPr lvl="4"/>
@@ -1738,7 +1757,6 @@
           <a:p>
             <a:fld id="{CD500CEA-160E-49C8-B972-D0B47816FB36}" type="datetimeFigureOut">
               <a:rPr lang="en-US" smtClean="0"/>
-              <a:t>8/24/2011</a:t>
             </a:fld>
             <a:endParaRPr lang="en-US"/>
           </a:p>
@@ -1780,7 +1798,6 @@
           <a:p>
             <a:fld id="{754A6C72-3788-48AC-AF84-02038561DE42}" type="slidenum">
               <a:rPr lang="en-US" smtClean="0"/>
-              <a:t>‹#›</a:t>
             </a:fld>
             <a:endParaRPr lang="en-US"/>
           </a:p>
@@ -1851,7 +1868,6 @@
           <a:p>
             <a:fld id="{CD500CEA-160E-49C8-B972-D0B47816FB36}" type="datetimeFigureOut">
               <a:rPr lang="en-US" smtClean="0"/>
-              <a:t>8/24/2011</a:t>
             </a:fld>
             <a:endParaRPr lang="en-US"/>
           </a:p>
@@ -1893,7 +1909,6 @@
           <a:p>
             <a:fld id="{754A6C72-3788-48AC-AF84-02038561DE42}" type="slidenum">
               <a:rPr lang="en-US" smtClean="0"/>
-              <a:t>‹#›</a:t>
             </a:fld>
             <a:endParaRPr lang="en-US"/>
           </a:p>
@@ -1941,7 +1956,6 @@
           <a:p>
             <a:fld id="{CD500CEA-160E-49C8-B972-D0B47816FB36}" type="datetimeFigureOut">
               <a:rPr lang="en-US" smtClean="0"/>
-              <a:t>8/24/2011</a:t>
             </a:fld>
             <a:endParaRPr lang="en-US"/>
           </a:p>
@@ -1983,7 +1997,6 @@
           <a:p>
             <a:fld id="{754A6C72-3788-48AC-AF84-02038561DE42}" type="slidenum">
               <a:rPr lang="en-US" smtClean="0"/>
-              <a:t>‹#›</a:t>
             </a:fld>
             <a:endParaRPr lang="en-US"/>
           </a:p>
@@ -2099,6 +2112,7 @@
               <a:rPr lang="en-US" smtClean="0"/>
               <a:t>Click to edit Master text styles</a:t>
             </a:r>
+            <a:endParaRPr lang="en-US" smtClean="0"/>
           </a:p>
           <a:p>
             <a:pPr lvl="1"/>
@@ -2106,6 +2120,7 @@
               <a:rPr lang="en-US" smtClean="0"/>
               <a:t>Second level</a:t>
             </a:r>
+            <a:endParaRPr lang="en-US" smtClean="0"/>
           </a:p>
           <a:p>
             <a:pPr lvl="2"/>
@@ -2113,6 +2128,7 @@
               <a:rPr lang="en-US" smtClean="0"/>
               <a:t>Third level</a:t>
             </a:r>
+            <a:endParaRPr lang="en-US" smtClean="0"/>
           </a:p>
           <a:p>
             <a:pPr lvl="3"/>
@@ -2120,6 +2136,7 @@
               <a:rPr lang="en-US" smtClean="0"/>
               <a:t>Fourth level</a:t>
             </a:r>
+            <a:endParaRPr lang="en-US" smtClean="0"/>
           </a:p>
           <a:p>
             <a:pPr lvl="4"/>
@@ -2193,6 +2210,7 @@
               <a:rPr lang="en-US" smtClean="0"/>
               <a:t>Click to edit Master text styles</a:t>
             </a:r>
+            <a:endParaRPr lang="en-US" smtClean="0"/>
           </a:p>
         </p:txBody>
       </p:sp>
@@ -2213,7 +2231,6 @@
           <a:p>
             <a:fld id="{CD500CEA-160E-49C8-B972-D0B47816FB36}" type="datetimeFigureOut">
               <a:rPr lang="en-US" smtClean="0"/>
-              <a:t>8/24/2011</a:t>
             </a:fld>
             <a:endParaRPr lang="en-US"/>
           </a:p>
@@ -2255,7 +2272,6 @@
           <a:p>
             <a:fld id="{754A6C72-3788-48AC-AF84-02038561DE42}" type="slidenum">
               <a:rPr lang="en-US" smtClean="0"/>
-              <a:t>‹#›</a:t>
             </a:fld>
             <a:endParaRPr lang="en-US"/>
           </a:p>
@@ -2441,6 +2457,7 @@
               <a:rPr lang="en-US" smtClean="0"/>
               <a:t>Click to edit Master text styles</a:t>
             </a:r>
+            <a:endParaRPr lang="en-US" smtClean="0"/>
           </a:p>
         </p:txBody>
       </p:sp>
@@ -2461,7 +2478,6 @@
           <a:p>
             <a:fld id="{CD500CEA-160E-49C8-B972-D0B47816FB36}" type="datetimeFigureOut">
               <a:rPr lang="en-US" smtClean="0"/>
-              <a:t>8/24/2011</a:t>
             </a:fld>
             <a:endParaRPr lang="en-US"/>
           </a:p>
@@ -2503,7 +2519,6 @@
           <a:p>
             <a:fld id="{754A6C72-3788-48AC-AF84-02038561DE42}" type="slidenum">
               <a:rPr lang="en-US" smtClean="0"/>
-              <a:t>‹#›</a:t>
             </a:fld>
             <a:endParaRPr lang="en-US"/>
           </a:p>
@@ -2602,6 +2617,7 @@
               <a:rPr lang="en-US" smtClean="0"/>
               <a:t>Click to edit Master text styles</a:t>
             </a:r>
+            <a:endParaRPr lang="en-US" smtClean="0"/>
           </a:p>
           <a:p>
             <a:pPr lvl="1"/>
@@ -2609,6 +2625,7 @@
               <a:rPr lang="en-US" smtClean="0"/>
               <a:t>Second level</a:t>
             </a:r>
+            <a:endParaRPr lang="en-US" smtClean="0"/>
           </a:p>
           <a:p>
             <a:pPr lvl="2"/>
@@ -2616,6 +2633,7 @@
               <a:rPr lang="en-US" smtClean="0"/>
               <a:t>Third level</a:t>
             </a:r>
+            <a:endParaRPr lang="en-US" smtClean="0"/>
           </a:p>
           <a:p>
             <a:pPr lvl="3"/>
@@ -2623,6 +2641,7 @@
               <a:rPr lang="en-US" smtClean="0"/>
               <a:t>Fourth level</a:t>
             </a:r>
+            <a:endParaRPr lang="en-US" smtClean="0"/>
           </a:p>
           <a:p>
             <a:pPr lvl="4"/>
@@ -2669,7 +2688,6 @@
           <a:p>
             <a:fld id="{CD500CEA-160E-49C8-B972-D0B47816FB36}" type="datetimeFigureOut">
               <a:rPr lang="en-US" smtClean="0"/>
-              <a:t>8/24/2011</a:t>
             </a:fld>
             <a:endParaRPr lang="en-US"/>
           </a:p>
@@ -2747,7 +2765,6 @@
           <a:p>
             <a:fld id="{754A6C72-3788-48AC-AF84-02038561DE42}" type="slidenum">
               <a:rPr lang="en-US" smtClean="0"/>
-              <a:t>‹#›</a:t>
             </a:fld>
             <a:endParaRPr lang="en-US"/>
           </a:p>
@@ -2791,7 +2808,7 @@
         <a:spcBef>
           <a:spcPct val="20000"/>
         </a:spcBef>
-        <a:buFont typeface="Arial" pitchFamily="34" charset="0"/>
+        <a:buFont typeface="Arial" panose="020B0604020202020204" pitchFamily="34" charset="0"/>
         <a:buChar char="•"/>
         <a:defRPr sz="3200" kern="1200">
           <a:solidFill>
@@ -2806,7 +2823,7 @@
         <a:spcBef>
           <a:spcPct val="20000"/>
         </a:spcBef>
-        <a:buFont typeface="Arial" pitchFamily="34" charset="0"/>
+        <a:buFont typeface="Arial" panose="020B0604020202020204" pitchFamily="34" charset="0"/>
         <a:buChar char="–"/>
         <a:defRPr sz="2800" kern="1200">
           <a:solidFill>
@@ -2821,7 +2838,7 @@
         <a:spcBef>
           <a:spcPct val="20000"/>
         </a:spcBef>
-        <a:buFont typeface="Arial" pitchFamily="34" charset="0"/>
+        <a:buFont typeface="Arial" panose="020B0604020202020204" pitchFamily="34" charset="0"/>
         <a:buChar char="•"/>
         <a:defRPr sz="2400" kern="1200">
           <a:solidFill>
@@ -2836,7 +2853,7 @@
         <a:spcBef>
           <a:spcPct val="20000"/>
         </a:spcBef>
-        <a:buFont typeface="Arial" pitchFamily="34" charset="0"/>
+        <a:buFont typeface="Arial" panose="020B0604020202020204" pitchFamily="34" charset="0"/>
         <a:buChar char="–"/>
         <a:defRPr sz="2000" kern="1200">
           <a:solidFill>
@@ -2851,7 +2868,7 @@
         <a:spcBef>
           <a:spcPct val="20000"/>
         </a:spcBef>
-        <a:buFont typeface="Arial" pitchFamily="34" charset="0"/>
+        <a:buFont typeface="Arial" panose="020B0604020202020204" pitchFamily="34" charset="0"/>
         <a:buChar char="»"/>
         <a:defRPr sz="2000" kern="1200">
           <a:solidFill>
@@ -2866,7 +2883,7 @@
         <a:spcBef>
           <a:spcPct val="20000"/>
         </a:spcBef>
-        <a:buFont typeface="Arial" pitchFamily="34" charset="0"/>
+        <a:buFont typeface="Arial" panose="020B0604020202020204" pitchFamily="34" charset="0"/>
         <a:buChar char="•"/>
         <a:defRPr sz="2000" kern="1200">
           <a:solidFill>
@@ -2881,7 +2898,7 @@
         <a:spcBef>
           <a:spcPct val="20000"/>
         </a:spcBef>
-        <a:buFont typeface="Arial" pitchFamily="34" charset="0"/>
+        <a:buFont typeface="Arial" panose="020B0604020202020204" pitchFamily="34" charset="0"/>
         <a:buChar char="•"/>
         <a:defRPr sz="2000" kern="1200">
           <a:solidFill>
@@ -2896,7 +2913,7 @@
         <a:spcBef>
           <a:spcPct val="20000"/>
         </a:spcBef>
-        <a:buFont typeface="Arial" pitchFamily="34" charset="0"/>
+        <a:buFont typeface="Arial" panose="020B0604020202020204" pitchFamily="34" charset="0"/>
         <a:buChar char="•"/>
         <a:defRPr sz="2000" kern="1200">
           <a:solidFill>
@@ -2911,7 +2928,7 @@
         <a:spcBef>
           <a:spcPct val="20000"/>
         </a:spcBef>
-        <a:buFont typeface="Arial" pitchFamily="34" charset="0"/>
+        <a:buFont typeface="Arial" panose="020B0604020202020204" pitchFamily="34" charset="0"/>
         <a:buChar char="•"/>
         <a:defRPr sz="2000" kern="1200">
           <a:solidFill>
@@ -3055,10 +3072,10 @@
           <a:lstStyle/>
           <a:p>
             <a:r>
-              <a:rPr lang="en-US" dirty="0" err="1" smtClean="0"/>
-              <a:t>BigBlueButton</a:t>
-            </a:r>
-            <a:endParaRPr lang="en-US" dirty="0"/>
+              <a:rPr lang="" altLang="en-US" dirty="0" err="1" smtClean="0"/>
+              <a:t>VISAR-Qtune</a:t>
+            </a:r>
+            <a:endParaRPr lang="" altLang="en-US" dirty="0" err="1" smtClean="0"/>
           </a:p>
         </p:txBody>
       </p:sp>
@@ -3659,7 +3676,10 @@
       </a:bgFillStyleLst>
     </a:fmtScheme>
   </a:themeElements>
-  <a:objectDefaults/>
-  <a:extraClrSchemeLst/>
+  <a:extLst>
+    <a:ext uri="{05A4C25C-085E-4340-85A3-A5531E510DB2}">
+      <thm15:themeFamily xmlns:thm15="http://schemas.microsoft.com/office/thememl/2012/main" name="Office Theme" id="{62F939B6-93AF-4DB8-9C6B-D6C7DFDC589F}" vid="{4A3C46E8-61CC-4603-A589-7422A47A8E4A}"/>
+    </a:ext>
+  </a:extLst>
 </a:theme>
 </file>
</xml_diff>